<commit_message>
removes ppt last page
</commit_message>
<xml_diff>
--- a/Presentation.pptx
+++ b/Presentation.pptx
@@ -20,7 +20,6 @@
     <p:sldId id="272" r:id="rId14"/>
     <p:sldId id="269" r:id="rId15"/>
     <p:sldId id="264" r:id="rId16"/>
-    <p:sldId id="266" r:id="rId17"/>
   </p:sldIdLst>
   <p:sldSz cx="12192000" cy="6858000"/>
   <p:notesSz cx="6858000" cy="9144000"/>
@@ -4934,239 +4933,6 @@
 </p:sld>
 </file>
 
-<file path=ppt/slides/slide16.xml><?xml version="1.0" encoding="utf-8"?>
-<p:sld xmlns:a="http://schemas.openxmlformats.org/drawingml/2006/main" xmlns:r="http://schemas.openxmlformats.org/officeDocument/2006/relationships" xmlns:p="http://schemas.openxmlformats.org/presentationml/2006/main">
-  <p:cSld>
-    <p:spTree>
-      <p:nvGrpSpPr>
-        <p:cNvPr id="1" name=""/>
-        <p:cNvGrpSpPr/>
-        <p:nvPr/>
-      </p:nvGrpSpPr>
-      <p:grpSpPr>
-        <a:xfrm>
-          <a:off x="0" y="0"/>
-          <a:ext cx="0" cy="0"/>
-          <a:chOff x="0" y="0"/>
-          <a:chExt cx="0" cy="0"/>
-        </a:xfrm>
-      </p:grpSpPr>
-      <p:sp>
-        <p:nvSpPr>
-          <p:cNvPr id="2" name="Titre 1">
-            <a:extLst>
-              <a:ext uri="{FF2B5EF4-FFF2-40B4-BE49-F238E27FC236}">
-                <a16:creationId xmlns:a16="http://schemas.microsoft.com/office/drawing/2014/main" id="{7B36D3EC-0CC5-0214-C6EE-9707D72F18D1}"/>
-              </a:ext>
-            </a:extLst>
-          </p:cNvPr>
-          <p:cNvSpPr>
-            <a:spLocks noGrp="1"/>
-          </p:cNvSpPr>
-          <p:nvPr>
-            <p:ph type="ctrTitle"/>
-          </p:nvPr>
-        </p:nvSpPr>
-        <p:spPr/>
-        <p:txBody>
-          <a:bodyPr/>
-          <a:lstStyle/>
-          <a:p>
-            <a:endParaRPr lang="fr-FR"/>
-          </a:p>
-        </p:txBody>
-      </p:sp>
-      <p:sp>
-        <p:nvSpPr>
-          <p:cNvPr id="3" name="Sous-titre 2">
-            <a:extLst>
-              <a:ext uri="{FF2B5EF4-FFF2-40B4-BE49-F238E27FC236}">
-                <a16:creationId xmlns:a16="http://schemas.microsoft.com/office/drawing/2014/main" id="{58819E77-9E72-019E-E3FB-6605BC2496B3}"/>
-              </a:ext>
-            </a:extLst>
-          </p:cNvPr>
-          <p:cNvSpPr>
-            <a:spLocks noGrp="1"/>
-          </p:cNvSpPr>
-          <p:nvPr>
-            <p:ph type="subTitle" idx="1"/>
-          </p:nvPr>
-        </p:nvSpPr>
-        <p:spPr/>
-        <p:txBody>
-          <a:bodyPr/>
-          <a:lstStyle/>
-          <a:p>
-            <a:endParaRPr lang="fr-FR"/>
-          </a:p>
-        </p:txBody>
-      </p:sp>
-      <p:pic>
-        <p:nvPicPr>
-          <p:cNvPr id="5" name="Image 4">
-            <a:extLst>
-              <a:ext uri="{FF2B5EF4-FFF2-40B4-BE49-F238E27FC236}">
-                <a16:creationId xmlns:a16="http://schemas.microsoft.com/office/drawing/2014/main" id="{F7CE8E4C-7D0C-3C2F-BCC0-ECDBA7A220B8}"/>
-              </a:ext>
-            </a:extLst>
-          </p:cNvPr>
-          <p:cNvPicPr>
-            <a:picLocks noChangeAspect="1"/>
-          </p:cNvPicPr>
-          <p:nvPr/>
-        </p:nvPicPr>
-        <p:blipFill>
-          <a:blip r:embed="rId2"/>
-          <a:stretch>
-            <a:fillRect/>
-          </a:stretch>
-        </p:blipFill>
-        <p:spPr>
-          <a:xfrm>
-            <a:off x="-19050" y="0"/>
-            <a:ext cx="12211050" cy="6847318"/>
-          </a:xfrm>
-          <a:prstGeom prst="rect">
-            <a:avLst/>
-          </a:prstGeom>
-        </p:spPr>
-      </p:pic>
-      <p:sp>
-        <p:nvSpPr>
-          <p:cNvPr id="7" name="ZoneTexte 6">
-            <a:extLst>
-              <a:ext uri="{FF2B5EF4-FFF2-40B4-BE49-F238E27FC236}">
-                <a16:creationId xmlns:a16="http://schemas.microsoft.com/office/drawing/2014/main" id="{40ADCF95-743B-3035-A54E-7503BB6AF953}"/>
-              </a:ext>
-            </a:extLst>
-          </p:cNvPr>
-          <p:cNvSpPr txBox="1"/>
-          <p:nvPr/>
-        </p:nvSpPr>
-        <p:spPr>
-          <a:xfrm>
-            <a:off x="1524000" y="2487802"/>
-            <a:ext cx="5007429" cy="1200329"/>
-          </a:xfrm>
-          <a:prstGeom prst="rect">
-            <a:avLst/>
-          </a:prstGeom>
-          <a:noFill/>
-        </p:spPr>
-        <p:txBody>
-          <a:bodyPr wrap="square">
-            <a:spAutoFit/>
-          </a:bodyPr>
-          <a:lstStyle/>
-          <a:p>
-            <a:pPr algn="l"/>
-            <a:r>
-              <a:rPr lang="fr-FR" sz="3600" b="1" i="0" dirty="0">
-                <a:solidFill>
-                  <a:schemeClr val="bg1"/>
-                </a:solidFill>
-                <a:effectLst/>
-                <a:latin typeface="ui-sans-serif"/>
-              </a:rPr>
-              <a:t>Facebook Comment Volume </a:t>
-            </a:r>
-            <a:r>
-              <a:rPr lang="fr-FR" sz="3600" b="1" i="0" dirty="0" err="1">
-                <a:solidFill>
-                  <a:schemeClr val="bg1"/>
-                </a:solidFill>
-                <a:effectLst/>
-                <a:latin typeface="ui-sans-serif"/>
-              </a:rPr>
-              <a:t>Dataset</a:t>
-            </a:r>
-            <a:endParaRPr lang="fr-FR" sz="3600" b="1" i="0" dirty="0">
-              <a:solidFill>
-                <a:schemeClr val="bg1"/>
-              </a:solidFill>
-              <a:effectLst/>
-              <a:latin typeface="ui-sans-serif"/>
-            </a:endParaRPr>
-          </a:p>
-        </p:txBody>
-      </p:sp>
-      <p:sp>
-        <p:nvSpPr>
-          <p:cNvPr id="8" name="ZoneTexte 7">
-            <a:extLst>
-              <a:ext uri="{FF2B5EF4-FFF2-40B4-BE49-F238E27FC236}">
-                <a16:creationId xmlns:a16="http://schemas.microsoft.com/office/drawing/2014/main" id="{C5EA65AF-044B-3919-AABE-21DA083936F5}"/>
-              </a:ext>
-            </a:extLst>
-          </p:cNvPr>
-          <p:cNvSpPr txBox="1"/>
-          <p:nvPr/>
-        </p:nvSpPr>
-        <p:spPr>
-          <a:xfrm>
-            <a:off x="1838131" y="5053570"/>
-            <a:ext cx="3349689" cy="646331"/>
-          </a:xfrm>
-          <a:prstGeom prst="rect">
-            <a:avLst/>
-          </a:prstGeom>
-          <a:noFill/>
-        </p:spPr>
-        <p:txBody>
-          <a:bodyPr wrap="square" rtlCol="0">
-            <a:spAutoFit/>
-          </a:bodyPr>
-          <a:lstStyle/>
-          <a:p>
-            <a:pPr algn="ctr"/>
-            <a:r>
-              <a:rPr lang="fr-FR" dirty="0">
-                <a:solidFill>
-                  <a:schemeClr val="bg1"/>
-                </a:solidFill>
-              </a:rPr>
-              <a:t>Louis Gauthier &amp; Aurore </a:t>
-            </a:r>
-            <a:r>
-              <a:rPr lang="fr-FR" dirty="0" err="1">
-                <a:solidFill>
-                  <a:schemeClr val="bg1"/>
-                </a:solidFill>
-              </a:rPr>
-              <a:t>Pistono</a:t>
-            </a:r>
-            <a:endParaRPr lang="fr-FR" dirty="0">
-              <a:solidFill>
-                <a:schemeClr val="bg1"/>
-              </a:solidFill>
-            </a:endParaRPr>
-          </a:p>
-          <a:p>
-            <a:pPr algn="ctr"/>
-            <a:r>
-              <a:rPr lang="fr-FR" dirty="0">
-                <a:solidFill>
-                  <a:schemeClr val="bg1"/>
-                </a:solidFill>
-              </a:rPr>
-              <a:t>DIA1</a:t>
-            </a:r>
-          </a:p>
-        </p:txBody>
-      </p:sp>
-    </p:spTree>
-    <p:extLst>
-      <p:ext uri="{BB962C8B-B14F-4D97-AF65-F5344CB8AC3E}">
-        <p14:creationId xmlns:p14="http://schemas.microsoft.com/office/powerpoint/2010/main" val="523802304"/>
-      </p:ext>
-    </p:extLst>
-  </p:cSld>
-  <p:clrMapOvr>
-    <a:masterClrMapping/>
-  </p:clrMapOvr>
-</p:sld>
-</file>
-
 <file path=ppt/slides/slide2.xml><?xml version="1.0" encoding="utf-8"?>
 <p:sld xmlns:a="http://schemas.openxmlformats.org/drawingml/2006/main" xmlns:r="http://schemas.openxmlformats.org/officeDocument/2006/relationships" xmlns:p="http://schemas.openxmlformats.org/presentationml/2006/main">
   <p:cSld>

</xml_diff>